<commit_message>
Added groupby slides back in
</commit_message>
<xml_diff>
--- a/Slides/Session2.pptx
+++ b/Slides/Session2.pptx
@@ -42,6 +42,14 @@
     <p:sldId id="287" r:id="rId39"/>
     <p:sldId id="288" r:id="rId40"/>
     <p:sldId id="289" r:id="rId41"/>
+    <p:sldId id="290" r:id="rId42"/>
+    <p:sldId id="291" r:id="rId43"/>
+    <p:sldId id="292" r:id="rId44"/>
+    <p:sldId id="293" r:id="rId45"/>
+    <p:sldId id="294" r:id="rId46"/>
+    <p:sldId id="295" r:id="rId47"/>
+    <p:sldId id="296" r:id="rId48"/>
+    <p:sldId id="297" r:id="rId49"/>
   </p:sldIdLst>
   <p:sldSz cx="13004800" cy="9753600"/>
   <p:notesSz cx="6858000" cy="9144000"/>
@@ -8455,7 +8463,7 @@
         </p:nvSpPr>
         <p:spPr>
           <a:xfrm>
-            <a:off x="441534" y="6564070"/>
+            <a:off x="441534" y="6564069"/>
             <a:ext cx="9585134" cy="2311401"/>
           </a:xfrm>
           <a:prstGeom prst="rect">
@@ -8829,6 +8837,465 @@
 </p:sld>
 </file>
 
+<file path=ppt/slides/slide35.xml><?xml version="1.0" encoding="utf-8"?>
+<p:sld xmlns:a="http://schemas.openxmlformats.org/drawingml/2006/main" xmlns:r="http://schemas.openxmlformats.org/officeDocument/2006/relationships" xmlns:p="http://schemas.openxmlformats.org/presentationml/2006/main" showMasterSp="1" showMasterPhAnim="1">
+  <p:cSld>
+    <p:spTree>
+      <p:nvGrpSpPr>
+        <p:cNvPr id="1" name=""/>
+        <p:cNvGrpSpPr/>
+        <p:nvPr/>
+      </p:nvGrpSpPr>
+      <p:grpSpPr>
+        <a:xfrm>
+          <a:off x="0" y="0"/>
+          <a:ext cx="0" cy="0"/>
+          <a:chOff x="0" y="0"/>
+          <a:chExt cx="0" cy="0"/>
+        </a:xfrm>
+      </p:grpSpPr>
+      <p:sp>
+        <p:nvSpPr>
+          <p:cNvPr id="306" name="Shape 306"/>
+          <p:cNvSpPr/>
+          <p:nvPr>
+            <p:ph type="title"/>
+          </p:nvPr>
+        </p:nvSpPr>
+        <p:spPr>
+          <a:xfrm>
+            <a:off x="2802102" y="4038600"/>
+            <a:ext cx="7400596" cy="4521200"/>
+          </a:xfrm>
+          <a:prstGeom prst="rect">
+            <a:avLst/>
+          </a:prstGeom>
+        </p:spPr>
+        <p:txBody>
+          <a:bodyPr/>
+          <a:lstStyle/>
+          <a:p>
+            <a:pPr/>
+            <a:r>
+              <a:t>Grouping</a:t>
+            </a:r>
+          </a:p>
+        </p:txBody>
+      </p:sp>
+    </p:spTree>
+  </p:cSld>
+  <p:clrMapOvr>
+    <a:masterClrMapping/>
+  </p:clrMapOvr>
+  <p:transition xmlns:p14="http://schemas.microsoft.com/office/powerpoint/2010/main" spd="med" advClick="1"/>
+</p:sld>
+</file>
+
+<file path=ppt/slides/slide36.xml><?xml version="1.0" encoding="utf-8"?>
+<p:sld xmlns:a="http://schemas.openxmlformats.org/drawingml/2006/main" xmlns:r="http://schemas.openxmlformats.org/officeDocument/2006/relationships" xmlns:p="http://schemas.openxmlformats.org/presentationml/2006/main" showMasterSp="1" showMasterPhAnim="1">
+  <p:cSld>
+    <p:spTree>
+      <p:nvGrpSpPr>
+        <p:cNvPr id="1" name=""/>
+        <p:cNvGrpSpPr/>
+        <p:nvPr/>
+      </p:nvGrpSpPr>
+      <p:grpSpPr>
+        <a:xfrm>
+          <a:off x="0" y="0"/>
+          <a:ext cx="0" cy="0"/>
+          <a:chOff x="0" y="0"/>
+          <a:chExt cx="0" cy="0"/>
+        </a:xfrm>
+      </p:grpSpPr>
+      <p:sp>
+        <p:nvSpPr>
+          <p:cNvPr id="308" name="Shape 308"/>
+          <p:cNvSpPr/>
+          <p:nvPr>
+            <p:ph type="title"/>
+          </p:nvPr>
+        </p:nvSpPr>
+        <p:spPr>
+          <a:xfrm>
+            <a:off x="406400" y="1536700"/>
+            <a:ext cx="12192000" cy="1169260"/>
+          </a:xfrm>
+          <a:prstGeom prst="rect">
+            <a:avLst/>
+          </a:prstGeom>
+        </p:spPr>
+        <p:txBody>
+          <a:bodyPr/>
+          <a:lstStyle>
+            <a:lvl1pPr defTabSz="403097">
+              <a:spcBef>
+                <a:spcPts val="1900"/>
+              </a:spcBef>
+              <a:defRPr sz="8280"/>
+            </a:lvl1pPr>
+          </a:lstStyle>
+          <a:p>
+            <a:pPr/>
+            <a:r>
+              <a:t>Group by statements</a:t>
+            </a:r>
+          </a:p>
+        </p:txBody>
+      </p:sp>
+      <p:sp>
+        <p:nvSpPr>
+          <p:cNvPr id="309" name="Shape 309"/>
+          <p:cNvSpPr/>
+          <p:nvPr/>
+        </p:nvSpPr>
+        <p:spPr>
+          <a:xfrm>
+            <a:off x="462014" y="4154175"/>
+            <a:ext cx="11795102" cy="2057401"/>
+          </a:xfrm>
+          <a:prstGeom prst="rect">
+            <a:avLst/>
+          </a:prstGeom>
+          <a:ln w="12700">
+            <a:miter lim="400000"/>
+          </a:ln>
+          <a:extLst>
+            <a:ext uri="{C572A759-6A51-4108-AA02-DFA0A04FC94B}">
+              <ma14:wrappingTextBoxFlag xmlns:ma14="http://schemas.microsoft.com/office/mac/drawingml/2011/main" val="1"/>
+            </a:ext>
+          </a:extLst>
+        </p:spPr>
+        <p:txBody>
+          <a:bodyPr lIns="50800" tIns="50800" rIns="50800" bIns="50800" anchor="ctr">
+            <a:spAutoFit/>
+          </a:bodyPr>
+          <a:lstStyle/>
+          <a:p>
+            <a:pPr>
+              <a:defRPr sz="5400">
+                <a:latin typeface="Anonymous Pro for Powerline"/>
+                <a:ea typeface="Anonymous Pro for Powerline"/>
+                <a:cs typeface="Anonymous Pro for Powerline"/>
+                <a:sym typeface="Anonymous Pro for Powerline"/>
+              </a:defRPr>
+            </a:pPr>
+            <a:r>
+              <a:t>SELECT key, SUM(data)</a:t>
+            </a:r>
+          </a:p>
+          <a:p>
+            <a:pPr>
+              <a:defRPr sz="5400">
+                <a:latin typeface="Anonymous Pro for Powerline"/>
+                <a:ea typeface="Anonymous Pro for Powerline"/>
+                <a:cs typeface="Anonymous Pro for Powerline"/>
+                <a:sym typeface="Anonymous Pro for Powerline"/>
+              </a:defRPr>
+            </a:pPr>
+            <a:r>
+              <a:t>FROM table GROUP BY key;</a:t>
+            </a:r>
+          </a:p>
+        </p:txBody>
+      </p:sp>
+    </p:spTree>
+  </p:cSld>
+  <p:clrMapOvr>
+    <a:masterClrMapping/>
+  </p:clrMapOvr>
+  <p:transition xmlns:p14="http://schemas.microsoft.com/office/powerpoint/2010/main" spd="med" advClick="1"/>
+</p:sld>
+</file>
+
+<file path=ppt/slides/slide37.xml><?xml version="1.0" encoding="utf-8"?>
+<p:sld xmlns:a="http://schemas.openxmlformats.org/drawingml/2006/main" xmlns:r="http://schemas.openxmlformats.org/officeDocument/2006/relationships" xmlns:p="http://schemas.openxmlformats.org/presentationml/2006/main" showMasterSp="1" showMasterPhAnim="1">
+  <p:cSld>
+    <p:spTree>
+      <p:nvGrpSpPr>
+        <p:cNvPr id="1" name=""/>
+        <p:cNvGrpSpPr/>
+        <p:nvPr/>
+      </p:nvGrpSpPr>
+      <p:grpSpPr>
+        <a:xfrm>
+          <a:off x="0" y="0"/>
+          <a:ext cx="0" cy="0"/>
+          <a:chOff x="0" y="0"/>
+          <a:chExt cx="0" cy="0"/>
+        </a:xfrm>
+      </p:grpSpPr>
+      <p:sp>
+        <p:nvSpPr>
+          <p:cNvPr id="311" name="Shape 311"/>
+          <p:cNvSpPr/>
+          <p:nvPr>
+            <p:ph type="title"/>
+          </p:nvPr>
+        </p:nvSpPr>
+        <p:spPr>
+          <a:xfrm>
+            <a:off x="406400" y="1536700"/>
+            <a:ext cx="12192000" cy="1169260"/>
+          </a:xfrm>
+          <a:prstGeom prst="rect">
+            <a:avLst/>
+          </a:prstGeom>
+        </p:spPr>
+        <p:txBody>
+          <a:bodyPr/>
+          <a:lstStyle>
+            <a:lvl1pPr defTabSz="403097">
+              <a:spcBef>
+                <a:spcPts val="1900"/>
+              </a:spcBef>
+              <a:defRPr sz="8280"/>
+            </a:lvl1pPr>
+          </a:lstStyle>
+          <a:p>
+            <a:pPr/>
+            <a:r>
+              <a:t>2 step process</a:t>
+            </a:r>
+          </a:p>
+        </p:txBody>
+      </p:sp>
+      <p:sp>
+        <p:nvSpPr>
+          <p:cNvPr id="312" name="Shape 312"/>
+          <p:cNvSpPr/>
+          <p:nvPr>
+            <p:ph type="body" idx="1"/>
+          </p:nvPr>
+        </p:nvSpPr>
+        <p:spPr>
+          <a:xfrm>
+            <a:off x="406400" y="2812441"/>
+            <a:ext cx="12192000" cy="6510182"/>
+          </a:xfrm>
+          <a:prstGeom prst="rect">
+            <a:avLst/>
+          </a:prstGeom>
+        </p:spPr>
+        <p:txBody>
+          <a:bodyPr/>
+          <a:lstStyle/>
+          <a:p>
+            <a:pPr marL="705970" indent="-705970">
+              <a:buClrTx/>
+              <a:buSzPct val="40000"/>
+              <a:buFontTx/>
+              <a:buBlip>
+                <a:blip r:embed="rId2"/>
+              </a:buBlip>
+              <a:defRPr sz="6400"/>
+            </a:pPr>
+            <a:r>
+              <a:t>Gather rows with same value in GROUP BY column </a:t>
+            </a:r>
+          </a:p>
+          <a:p>
+            <a:pPr marL="705970" indent="-705970">
+              <a:buClrTx/>
+              <a:buSzPct val="40000"/>
+              <a:buFontTx/>
+              <a:buBlip>
+                <a:blip r:embed="rId2"/>
+              </a:buBlip>
+              <a:defRPr sz="6400"/>
+            </a:pPr>
+            <a:r>
+              <a:t>Combine each collection of rows with an AGGREGATION function</a:t>
+            </a:r>
+          </a:p>
+        </p:txBody>
+      </p:sp>
+    </p:spTree>
+  </p:cSld>
+  <p:clrMapOvr>
+    <a:masterClrMapping/>
+  </p:clrMapOvr>
+  <p:transition xmlns:p14="http://schemas.microsoft.com/office/powerpoint/2010/main" spd="med" advClick="1"/>
+</p:sld>
+</file>
+
+<file path=ppt/slides/slide38.xml><?xml version="1.0" encoding="utf-8"?>
+<p:sld xmlns:a="http://schemas.openxmlformats.org/drawingml/2006/main" xmlns:r="http://schemas.openxmlformats.org/officeDocument/2006/relationships" xmlns:p="http://schemas.openxmlformats.org/presentationml/2006/main" showMasterSp="1" showMasterPhAnim="1">
+  <p:cSld>
+    <p:bg>
+      <p:bgPr>
+        <a:noFill/>
+      </p:bgPr>
+    </p:bg>
+    <p:spTree>
+      <p:nvGrpSpPr>
+        <p:cNvPr id="1" name=""/>
+        <p:cNvGrpSpPr/>
+        <p:nvPr/>
+      </p:nvGrpSpPr>
+      <p:grpSpPr>
+        <a:xfrm>
+          <a:off x="0" y="0"/>
+          <a:ext cx="0" cy="0"/>
+          <a:chOff x="0" y="0"/>
+          <a:chExt cx="0" cy="0"/>
+        </a:xfrm>
+      </p:grpSpPr>
+      <p:pic>
+        <p:nvPicPr>
+          <p:cNvPr id="314" name="pasted-image.tiff"/>
+          <p:cNvPicPr>
+            <a:picLocks noChangeAspect="1"/>
+          </p:cNvPicPr>
+          <p:nvPr/>
+        </p:nvPicPr>
+        <p:blipFill>
+          <a:blip r:embed="rId2">
+            <a:extLst/>
+          </a:blip>
+          <a:stretch>
+            <a:fillRect/>
+          </a:stretch>
+        </p:blipFill>
+        <p:spPr>
+          <a:xfrm>
+            <a:off x="-17945" y="5541"/>
+            <a:ext cx="13040690" cy="9780518"/>
+          </a:xfrm>
+          <a:prstGeom prst="rect">
+            <a:avLst/>
+          </a:prstGeom>
+          <a:ln w="12700">
+            <a:miter lim="400000"/>
+          </a:ln>
+        </p:spPr>
+      </p:pic>
+    </p:spTree>
+  </p:cSld>
+  <p:clrMapOvr>
+    <a:masterClrMapping/>
+  </p:clrMapOvr>
+  <p:transition xmlns:p14="http://schemas.microsoft.com/office/powerpoint/2010/main" spd="med" advClick="1"/>
+</p:sld>
+</file>
+
+<file path=ppt/slides/slide39.xml><?xml version="1.0" encoding="utf-8"?>
+<p:sld xmlns:a="http://schemas.openxmlformats.org/drawingml/2006/main" xmlns:r="http://schemas.openxmlformats.org/officeDocument/2006/relationships" xmlns:p="http://schemas.openxmlformats.org/presentationml/2006/main" showMasterSp="1" showMasterPhAnim="1">
+  <p:cSld>
+    <p:spTree>
+      <p:nvGrpSpPr>
+        <p:cNvPr id="1" name=""/>
+        <p:cNvGrpSpPr/>
+        <p:nvPr/>
+      </p:nvGrpSpPr>
+      <p:grpSpPr>
+        <a:xfrm>
+          <a:off x="0" y="0"/>
+          <a:ext cx="0" cy="0"/>
+          <a:chOff x="0" y="0"/>
+          <a:chExt cx="0" cy="0"/>
+        </a:xfrm>
+      </p:grpSpPr>
+      <p:sp>
+        <p:nvSpPr>
+          <p:cNvPr id="316" name="Shape 316"/>
+          <p:cNvSpPr/>
+          <p:nvPr>
+            <p:ph type="title"/>
+          </p:nvPr>
+        </p:nvSpPr>
+        <p:spPr>
+          <a:xfrm>
+            <a:off x="406400" y="1536700"/>
+            <a:ext cx="12192000" cy="1169260"/>
+          </a:xfrm>
+          <a:prstGeom prst="rect">
+            <a:avLst/>
+          </a:prstGeom>
+        </p:spPr>
+        <p:txBody>
+          <a:bodyPr/>
+          <a:lstStyle>
+            <a:lvl1pPr defTabSz="403097">
+              <a:spcBef>
+                <a:spcPts val="1900"/>
+              </a:spcBef>
+              <a:defRPr sz="8280"/>
+            </a:lvl1pPr>
+          </a:lstStyle>
+          <a:p>
+            <a:pPr/>
+            <a:r>
+              <a:t>Group by statements</a:t>
+            </a:r>
+          </a:p>
+        </p:txBody>
+      </p:sp>
+      <p:sp>
+        <p:nvSpPr>
+          <p:cNvPr id="317" name="Shape 317"/>
+          <p:cNvSpPr/>
+          <p:nvPr/>
+        </p:nvSpPr>
+        <p:spPr>
+          <a:xfrm>
+            <a:off x="462014" y="4154175"/>
+            <a:ext cx="12192002" cy="2057401"/>
+          </a:xfrm>
+          <a:prstGeom prst="rect">
+            <a:avLst/>
+          </a:prstGeom>
+          <a:ln w="12700">
+            <a:miter lim="400000"/>
+          </a:ln>
+          <a:extLst>
+            <a:ext uri="{C572A759-6A51-4108-AA02-DFA0A04FC94B}">
+              <ma14:wrappingTextBoxFlag xmlns:ma14="http://schemas.microsoft.com/office/mac/drawingml/2011/main" val="1"/>
+            </a:ext>
+          </a:extLst>
+        </p:spPr>
+        <p:txBody>
+          <a:bodyPr lIns="50800" tIns="50800" rIns="50800" bIns="50800" anchor="ctr">
+            <a:spAutoFit/>
+          </a:bodyPr>
+          <a:lstStyle/>
+          <a:p>
+            <a:pPr>
+              <a:defRPr sz="5400">
+                <a:latin typeface="Anonymous Pro for Powerline"/>
+                <a:ea typeface="Anonymous Pro for Powerline"/>
+                <a:cs typeface="Anonymous Pro for Powerline"/>
+                <a:sym typeface="Anonymous Pro for Powerline"/>
+              </a:defRPr>
+            </a:pPr>
+            <a:r>
+              <a:t>SELECT user_id, COUNT(*)</a:t>
+            </a:r>
+          </a:p>
+          <a:p>
+            <a:pPr>
+              <a:defRPr sz="5400">
+                <a:latin typeface="Anonymous Pro for Powerline"/>
+                <a:ea typeface="Anonymous Pro for Powerline"/>
+                <a:cs typeface="Anonymous Pro for Powerline"/>
+                <a:sym typeface="Anonymous Pro for Powerline"/>
+              </a:defRPr>
+            </a:pPr>
+            <a:r>
+              <a:t>FROM purchases GROUP BY user_id;</a:t>
+            </a:r>
+          </a:p>
+        </p:txBody>
+      </p:sp>
+    </p:spTree>
+  </p:cSld>
+  <p:clrMapOvr>
+    <a:masterClrMapping/>
+  </p:clrMapOvr>
+  <p:transition xmlns:p14="http://schemas.microsoft.com/office/powerpoint/2010/main" spd="med" advClick="1"/>
+</p:sld>
+</file>
+
 <file path=ppt/slides/slide4.xml><?xml version="1.0" encoding="utf-8"?>
 <p:sld xmlns:a="http://schemas.openxmlformats.org/drawingml/2006/main" xmlns:r="http://schemas.openxmlformats.org/officeDocument/2006/relationships" xmlns:p="http://schemas.openxmlformats.org/presentationml/2006/main" showMasterSp="1" showMasterPhAnim="1">
   <p:cSld>
@@ -8940,6 +9407,284 @@
             </a:pPr>
             <a:r>
               <a:t>How many customers were from Florida?</a:t>
+            </a:r>
+          </a:p>
+        </p:txBody>
+      </p:sp>
+    </p:spTree>
+  </p:cSld>
+  <p:clrMapOvr>
+    <a:masterClrMapping/>
+  </p:clrMapOvr>
+  <p:transition xmlns:p14="http://schemas.microsoft.com/office/powerpoint/2010/main" spd="med" advClick="1"/>
+</p:sld>
+</file>
+
+<file path=ppt/slides/slide40.xml><?xml version="1.0" encoding="utf-8"?>
+<p:sld xmlns:a="http://schemas.openxmlformats.org/drawingml/2006/main" xmlns:r="http://schemas.openxmlformats.org/officeDocument/2006/relationships" xmlns:p="http://schemas.openxmlformats.org/presentationml/2006/main" showMasterSp="1" showMasterPhAnim="1">
+  <p:cSld>
+    <p:spTree>
+      <p:nvGrpSpPr>
+        <p:cNvPr id="1" name=""/>
+        <p:cNvGrpSpPr/>
+        <p:nvPr/>
+      </p:nvGrpSpPr>
+      <p:grpSpPr>
+        <a:xfrm>
+          <a:off x="0" y="0"/>
+          <a:ext cx="0" cy="0"/>
+          <a:chOff x="0" y="0"/>
+          <a:chExt cx="0" cy="0"/>
+        </a:xfrm>
+      </p:grpSpPr>
+      <p:sp>
+        <p:nvSpPr>
+          <p:cNvPr id="319" name="Shape 319"/>
+          <p:cNvSpPr/>
+          <p:nvPr>
+            <p:ph type="title"/>
+          </p:nvPr>
+        </p:nvSpPr>
+        <p:spPr>
+          <a:xfrm>
+            <a:off x="406400" y="1536700"/>
+            <a:ext cx="12192000" cy="1169260"/>
+          </a:xfrm>
+          <a:prstGeom prst="rect">
+            <a:avLst/>
+          </a:prstGeom>
+        </p:spPr>
+        <p:txBody>
+          <a:bodyPr/>
+          <a:lstStyle>
+            <a:lvl1pPr defTabSz="403097">
+              <a:spcBef>
+                <a:spcPts val="1900"/>
+              </a:spcBef>
+              <a:defRPr sz="8280"/>
+            </a:lvl1pPr>
+          </a:lstStyle>
+          <a:p>
+            <a:pPr/>
+            <a:r>
+              <a:t>Group by statements</a:t>
+            </a:r>
+          </a:p>
+        </p:txBody>
+      </p:sp>
+      <p:sp>
+        <p:nvSpPr>
+          <p:cNvPr id="320" name="Shape 320"/>
+          <p:cNvSpPr/>
+          <p:nvPr/>
+        </p:nvSpPr>
+        <p:spPr>
+          <a:xfrm>
+            <a:off x="462014" y="4154175"/>
+            <a:ext cx="11795102" cy="2057401"/>
+          </a:xfrm>
+          <a:prstGeom prst="rect">
+            <a:avLst/>
+          </a:prstGeom>
+          <a:ln w="12700">
+            <a:miter lim="400000"/>
+          </a:ln>
+          <a:extLst>
+            <a:ext uri="{C572A759-6A51-4108-AA02-DFA0A04FC94B}">
+              <ma14:wrappingTextBoxFlag xmlns:ma14="http://schemas.microsoft.com/office/mac/drawingml/2011/main" val="1"/>
+            </a:ext>
+          </a:extLst>
+        </p:spPr>
+        <p:txBody>
+          <a:bodyPr lIns="50800" tIns="50800" rIns="50800" bIns="50800" anchor="ctr">
+            <a:spAutoFit/>
+          </a:bodyPr>
+          <a:lstStyle/>
+          <a:p>
+            <a:pPr>
+              <a:defRPr sz="5400">
+                <a:latin typeface="Anonymous Pro for Powerline"/>
+                <a:ea typeface="Anonymous Pro for Powerline"/>
+                <a:cs typeface="Anonymous Pro for Powerline"/>
+                <a:sym typeface="Anonymous Pro for Powerline"/>
+              </a:defRPr>
+            </a:pPr>
+            <a:r>
+              <a:t>SELECT state, AVG(*)</a:t>
+            </a:r>
+          </a:p>
+          <a:p>
+            <a:pPr>
+              <a:defRPr sz="5400">
+                <a:latin typeface="Anonymous Pro for Powerline"/>
+                <a:ea typeface="Anonymous Pro for Powerline"/>
+                <a:cs typeface="Anonymous Pro for Powerline"/>
+                <a:sym typeface="Anonymous Pro for Powerline"/>
+              </a:defRPr>
+            </a:pPr>
+            <a:r>
+              <a:t>FROM purchases GROUP BY state;</a:t>
+            </a:r>
+          </a:p>
+        </p:txBody>
+      </p:sp>
+    </p:spTree>
+  </p:cSld>
+  <p:clrMapOvr>
+    <a:masterClrMapping/>
+  </p:clrMapOvr>
+  <p:transition xmlns:p14="http://schemas.microsoft.com/office/powerpoint/2010/main" spd="med" advClick="1"/>
+</p:sld>
+</file>
+
+<file path=ppt/slides/slide41.xml><?xml version="1.0" encoding="utf-8"?>
+<p:sld xmlns:a="http://schemas.openxmlformats.org/drawingml/2006/main" xmlns:r="http://schemas.openxmlformats.org/officeDocument/2006/relationships" xmlns:p="http://schemas.openxmlformats.org/presentationml/2006/main" showMasterSp="1" showMasterPhAnim="1">
+  <p:cSld>
+    <p:spTree>
+      <p:nvGrpSpPr>
+        <p:cNvPr id="1" name=""/>
+        <p:cNvGrpSpPr/>
+        <p:nvPr/>
+      </p:nvGrpSpPr>
+      <p:grpSpPr>
+        <a:xfrm>
+          <a:off x="0" y="0"/>
+          <a:ext cx="0" cy="0"/>
+          <a:chOff x="0" y="0"/>
+          <a:chExt cx="0" cy="0"/>
+        </a:xfrm>
+      </p:grpSpPr>
+      <p:sp>
+        <p:nvSpPr>
+          <p:cNvPr id="322" name="Shape 322"/>
+          <p:cNvSpPr/>
+          <p:nvPr>
+            <p:ph type="title"/>
+          </p:nvPr>
+        </p:nvSpPr>
+        <p:spPr>
+          <a:xfrm>
+            <a:off x="406400" y="1536700"/>
+            <a:ext cx="12192000" cy="1169260"/>
+          </a:xfrm>
+          <a:prstGeom prst="rect">
+            <a:avLst/>
+          </a:prstGeom>
+        </p:spPr>
+        <p:txBody>
+          <a:bodyPr/>
+          <a:lstStyle>
+            <a:lvl1pPr defTabSz="403097">
+              <a:spcBef>
+                <a:spcPts val="1900"/>
+              </a:spcBef>
+              <a:defRPr sz="8280"/>
+            </a:lvl1pPr>
+          </a:lstStyle>
+          <a:p>
+            <a:pPr/>
+            <a:r>
+              <a:t>Rules for Group by</a:t>
+            </a:r>
+          </a:p>
+        </p:txBody>
+      </p:sp>
+      <p:sp>
+        <p:nvSpPr>
+          <p:cNvPr id="323" name="Shape 323"/>
+          <p:cNvSpPr/>
+          <p:nvPr>
+            <p:ph type="body" idx="1"/>
+          </p:nvPr>
+        </p:nvSpPr>
+        <p:spPr>
+          <a:xfrm>
+            <a:off x="406400" y="3055947"/>
+            <a:ext cx="12192001" cy="6108377"/>
+          </a:xfrm>
+          <a:prstGeom prst="rect">
+            <a:avLst/>
+          </a:prstGeom>
+        </p:spPr>
+        <p:txBody>
+          <a:bodyPr/>
+          <a:lstStyle/>
+          <a:p>
+            <a:pPr marL="1243105" indent="-1243105">
+              <a:buClrTx/>
+              <a:buSzPct val="100000"/>
+              <a:buFontTx/>
+              <a:buAutoNum type="arabicPeriod" startAt="1"/>
+              <a:defRPr sz="6400"/>
+            </a:pPr>
+            <a:r>
+              <a:t>SELECT must include column you’re grouping by</a:t>
+            </a:r>
+          </a:p>
+          <a:p>
+            <a:pPr marL="1243105" indent="-1243105">
+              <a:buClrTx/>
+              <a:buSzPct val="100000"/>
+              <a:buFontTx/>
+              <a:buAutoNum type="arabicPeriod" startAt="1"/>
+              <a:defRPr sz="6400"/>
+            </a:pPr>
+            <a:r>
+              <a:t>All other columns must be aggregated</a:t>
+            </a:r>
+          </a:p>
+        </p:txBody>
+      </p:sp>
+    </p:spTree>
+  </p:cSld>
+  <p:clrMapOvr>
+    <a:masterClrMapping/>
+  </p:clrMapOvr>
+  <p:transition xmlns:p14="http://schemas.microsoft.com/office/powerpoint/2010/main" spd="med" advClick="1"/>
+</p:sld>
+</file>
+
+<file path=ppt/slides/slide42.xml><?xml version="1.0" encoding="utf-8"?>
+<p:sld xmlns:a="http://schemas.openxmlformats.org/drawingml/2006/main" xmlns:r="http://schemas.openxmlformats.org/officeDocument/2006/relationships" xmlns:p="http://schemas.openxmlformats.org/presentationml/2006/main" showMasterSp="1" showMasterPhAnim="1">
+  <p:cSld>
+    <p:spTree>
+      <p:nvGrpSpPr>
+        <p:cNvPr id="1" name=""/>
+        <p:cNvGrpSpPr/>
+        <p:nvPr/>
+      </p:nvGrpSpPr>
+      <p:grpSpPr>
+        <a:xfrm>
+          <a:off x="0" y="0"/>
+          <a:ext cx="0" cy="0"/>
+          <a:chOff x="0" y="0"/>
+          <a:chExt cx="0" cy="0"/>
+        </a:xfrm>
+      </p:grpSpPr>
+      <p:sp>
+        <p:nvSpPr>
+          <p:cNvPr id="325" name="Shape 325"/>
+          <p:cNvSpPr/>
+          <p:nvPr>
+            <p:ph type="title"/>
+          </p:nvPr>
+        </p:nvSpPr>
+        <p:spPr>
+          <a:xfrm>
+            <a:off x="2802102" y="4038600"/>
+            <a:ext cx="7400596" cy="4521200"/>
+          </a:xfrm>
+          <a:prstGeom prst="rect">
+            <a:avLst/>
+          </a:prstGeom>
+        </p:spPr>
+        <p:txBody>
+          <a:bodyPr/>
+          <a:lstStyle/>
+          <a:p>
+            <a:pPr/>
+            <a:r>
+              <a:t>Exercises</a:t>
             </a:r>
           </a:p>
         </p:txBody>
@@ -9148,7 +9893,7 @@
         <p:spPr>
           <a:xfrm>
             <a:off x="406400" y="3953767"/>
-            <a:ext cx="12192001" cy="5368856"/>
+            <a:ext cx="12192000" cy="5368856"/>
           </a:xfrm>
           <a:prstGeom prst="rect">
             <a:avLst/>

</xml_diff>